<commit_message>
Final updates for #203
</commit_message>
<xml_diff>
--- a/img/microprofile-layers.pptx
+++ b/img/microprofile-layers.pptx
@@ -259,7 +259,7 @@
           <a:p>
             <a:fld id="{560CAE67-5DF8-ED46-9BC4-17886CFB86D2}" type="datetimeFigureOut">
               <a:rPr lang="en-US" smtClean="0"/>
-              <a:t>4/3/19</a:t>
+              <a:t>5/22/19</a:t>
             </a:fld>
             <a:endParaRPr lang="en-US"/>
           </a:p>
@@ -457,7 +457,7 @@
           <a:p>
             <a:fld id="{560CAE67-5DF8-ED46-9BC4-17886CFB86D2}" type="datetimeFigureOut">
               <a:rPr lang="en-US" smtClean="0"/>
-              <a:t>4/3/19</a:t>
+              <a:t>5/22/19</a:t>
             </a:fld>
             <a:endParaRPr lang="en-US"/>
           </a:p>
@@ -665,7 +665,7 @@
           <a:p>
             <a:fld id="{560CAE67-5DF8-ED46-9BC4-17886CFB86D2}" type="datetimeFigureOut">
               <a:rPr lang="en-US" smtClean="0"/>
-              <a:t>4/3/19</a:t>
+              <a:t>5/22/19</a:t>
             </a:fld>
             <a:endParaRPr lang="en-US"/>
           </a:p>
@@ -863,7 +863,7 @@
           <a:p>
             <a:fld id="{560CAE67-5DF8-ED46-9BC4-17886CFB86D2}" type="datetimeFigureOut">
               <a:rPr lang="en-US" smtClean="0"/>
-              <a:t>4/3/19</a:t>
+              <a:t>5/22/19</a:t>
             </a:fld>
             <a:endParaRPr lang="en-US"/>
           </a:p>
@@ -1138,7 +1138,7 @@
           <a:p>
             <a:fld id="{560CAE67-5DF8-ED46-9BC4-17886CFB86D2}" type="datetimeFigureOut">
               <a:rPr lang="en-US" smtClean="0"/>
-              <a:t>4/3/19</a:t>
+              <a:t>5/22/19</a:t>
             </a:fld>
             <a:endParaRPr lang="en-US"/>
           </a:p>
@@ -1403,7 +1403,7 @@
           <a:p>
             <a:fld id="{560CAE67-5DF8-ED46-9BC4-17886CFB86D2}" type="datetimeFigureOut">
               <a:rPr lang="en-US" smtClean="0"/>
-              <a:t>4/3/19</a:t>
+              <a:t>5/22/19</a:t>
             </a:fld>
             <a:endParaRPr lang="en-US"/>
           </a:p>
@@ -1815,7 +1815,7 @@
           <a:p>
             <a:fld id="{560CAE67-5DF8-ED46-9BC4-17886CFB86D2}" type="datetimeFigureOut">
               <a:rPr lang="en-US" smtClean="0"/>
-              <a:t>4/3/19</a:t>
+              <a:t>5/22/19</a:t>
             </a:fld>
             <a:endParaRPr lang="en-US"/>
           </a:p>
@@ -1956,7 +1956,7 @@
           <a:p>
             <a:fld id="{560CAE67-5DF8-ED46-9BC4-17886CFB86D2}" type="datetimeFigureOut">
               <a:rPr lang="en-US" smtClean="0"/>
-              <a:t>4/3/19</a:t>
+              <a:t>5/22/19</a:t>
             </a:fld>
             <a:endParaRPr lang="en-US"/>
           </a:p>
@@ -2069,7 +2069,7 @@
           <a:p>
             <a:fld id="{560CAE67-5DF8-ED46-9BC4-17886CFB86D2}" type="datetimeFigureOut">
               <a:rPr lang="en-US" smtClean="0"/>
-              <a:t>4/3/19</a:t>
+              <a:t>5/22/19</a:t>
             </a:fld>
             <a:endParaRPr lang="en-US"/>
           </a:p>
@@ -2380,7 +2380,7 @@
           <a:p>
             <a:fld id="{560CAE67-5DF8-ED46-9BC4-17886CFB86D2}" type="datetimeFigureOut">
               <a:rPr lang="en-US" smtClean="0"/>
-              <a:t>4/3/19</a:t>
+              <a:t>5/22/19</a:t>
             </a:fld>
             <a:endParaRPr lang="en-US"/>
           </a:p>
@@ -2668,7 +2668,7 @@
           <a:p>
             <a:fld id="{560CAE67-5DF8-ED46-9BC4-17886CFB86D2}" type="datetimeFigureOut">
               <a:rPr lang="en-US" smtClean="0"/>
-              <a:t>4/3/19</a:t>
+              <a:t>5/22/19</a:t>
             </a:fld>
             <a:endParaRPr lang="en-US"/>
           </a:p>
@@ -2909,7 +2909,7 @@
           <a:p>
             <a:fld id="{560CAE67-5DF8-ED46-9BC4-17886CFB86D2}" type="datetimeFigureOut">
               <a:rPr lang="en-US" smtClean="0"/>
-              <a:t>4/3/19</a:t>
+              <a:t>5/22/19</a:t>
             </a:fld>
             <a:endParaRPr lang="en-US"/>
           </a:p>
@@ -3340,8 +3340,8 @@
         </p:nvSpPr>
         <p:spPr>
           <a:xfrm>
-            <a:off x="819809" y="1398979"/>
-            <a:ext cx="10404344" cy="3966678"/>
+            <a:off x="851338" y="1516224"/>
+            <a:ext cx="10469735" cy="3823031"/>
           </a:xfrm>
           <a:prstGeom prst="rect">
             <a:avLst/>
@@ -3396,8 +3396,8 @@
         </p:nvSpPr>
         <p:spPr>
           <a:xfrm>
-            <a:off x="4575490" y="5078835"/>
-            <a:ext cx="3615531" cy="584775"/>
+            <a:off x="4307622" y="5048172"/>
+            <a:ext cx="3552659" cy="584775"/>
           </a:xfrm>
           <a:prstGeom prst="rect">
             <a:avLst/>
@@ -3434,14 +3434,14 @@
           <p:nvPr>
             <p:extLst>
               <p:ext uri="{D42A27DB-BD31-4B8C-83A1-F6EECF244321}">
-                <p14:modId xmlns:p14="http://schemas.microsoft.com/office/powerpoint/2010/main" val="2204597677"/>
+                <p14:modId xmlns:p14="http://schemas.microsoft.com/office/powerpoint/2010/main" val="3232219925"/>
               </p:ext>
             </p:extLst>
           </p:nvPr>
         </p:nvGraphicFramePr>
         <p:xfrm>
-          <a:off x="1009636" y="1612805"/>
-          <a:ext cx="10025560" cy="3388509"/>
+          <a:off x="1063896" y="1725852"/>
+          <a:ext cx="10040112" cy="3322320"/>
         </p:xfrm>
         <a:graphic>
           <a:graphicData uri="http://schemas.openxmlformats.org/drawingml/2006/table">
@@ -3450,55 +3450,54 @@
                 <a:tableStyleId>{5C22544A-7EE6-4342-B048-85BDC9FD1C3A}</a:tableStyleId>
               </a:tblPr>
               <a:tblGrid>
-                <a:gridCol w="2005112">
+                <a:gridCol w="1673352">
                   <a:extLst>
                     <a:ext uri="{9D8B030D-6E8A-4147-A177-3AD203B41FA5}">
                       <a16:colId xmlns:a16="http://schemas.microsoft.com/office/drawing/2014/main" val="2453142836"/>
                     </a:ext>
                   </a:extLst>
                 </a:gridCol>
-                <a:gridCol w="2005112">
+                <a:gridCol w="1673352">
                   <a:extLst>
                     <a:ext uri="{9D8B030D-6E8A-4147-A177-3AD203B41FA5}">
                       <a16:colId xmlns:a16="http://schemas.microsoft.com/office/drawing/2014/main" val="3352789823"/>
                     </a:ext>
                   </a:extLst>
                 </a:gridCol>
-                <a:gridCol w="2005112">
+                <a:gridCol w="1673352">
                   <a:extLst>
                     <a:ext uri="{9D8B030D-6E8A-4147-A177-3AD203B41FA5}">
                       <a16:colId xmlns:a16="http://schemas.microsoft.com/office/drawing/2014/main" val="2607940811"/>
                     </a:ext>
                   </a:extLst>
                 </a:gridCol>
-                <a:gridCol w="2005112">
+                <a:gridCol w="1673352">
                   <a:extLst>
                     <a:ext uri="{9D8B030D-6E8A-4147-A177-3AD203B41FA5}">
                       <a16:colId xmlns:a16="http://schemas.microsoft.com/office/drawing/2014/main" val="805729673"/>
                     </a:ext>
                   </a:extLst>
                 </a:gridCol>
-                <a:gridCol w="2005112">
+                <a:gridCol w="1673352">
                   <a:extLst>
                     <a:ext uri="{9D8B030D-6E8A-4147-A177-3AD203B41FA5}">
                       <a16:colId xmlns:a16="http://schemas.microsoft.com/office/drawing/2014/main" val="176977035"/>
                     </a:ext>
                   </a:extLst>
                 </a:gridCol>
+                <a:gridCol w="1673352">
+                  <a:extLst>
+                    <a:ext uri="{9D8B030D-6E8A-4147-A177-3AD203B41FA5}">
+                      <a16:colId xmlns:a16="http://schemas.microsoft.com/office/drawing/2014/main" val="1382515521"/>
+                    </a:ext>
+                  </a:extLst>
+                </a:gridCol>
               </a:tblGrid>
-              <a:tr h="1129503">
+              <a:tr h="1107440">
                 <a:tc>
                   <a:txBody>
                     <a:bodyPr/>
                     <a:lstStyle/>
-                    <a:p>
-                      <a:pPr algn="ctr" fontAlgn="ctr"/>
-                      <a:endParaRPr lang="en-US" sz="2000" b="1" baseline="0" dirty="0">
-                        <a:solidFill>
-                          <a:schemeClr val="bg1"/>
-                        </a:solidFill>
-                      </a:endParaRPr>
-                    </a:p>
                     <a:p>
                       <a:pPr algn="ctr" fontAlgn="ctr"/>
                       <a:r>
@@ -3511,7 +3510,7 @@
                       </a:r>
                     </a:p>
                   </a:txBody>
-                  <a:tcPr>
+                  <a:tcPr anchor="ctr">
                     <a:lnL w="12700" cap="flat" cmpd="sng" algn="ctr">
                       <a:solidFill>
                         <a:schemeClr val="tx1"/>
@@ -3604,7 +3603,7 @@
                       </a:endParaRPr>
                     </a:p>
                   </a:txBody>
-                  <a:tcPr>
+                  <a:tcPr anchor="ctr">
                     <a:lnL w="12700" cap="flat" cmpd="sng" algn="ctr">
                       <a:solidFill>
                         <a:schemeClr val="tx1"/>
@@ -3697,7 +3696,7 @@
                       </a:endParaRPr>
                     </a:p>
                   </a:txBody>
-                  <a:tcPr>
+                  <a:tcPr anchor="ctr">
                     <a:lnL w="12700" cap="flat" cmpd="sng" algn="ctr">
                       <a:solidFill>
                         <a:schemeClr val="tx1"/>
@@ -3856,13 +3855,6 @@
                     <a:noFill/>
                   </a:tcPr>
                 </a:tc>
-                <a:extLst>
-                  <a:ext uri="{0D108BD9-81ED-4DB2-BD59-A6C34878D82A}">
-                    <a16:rowId xmlns:a16="http://schemas.microsoft.com/office/drawing/2014/main" val="3678049630"/>
-                  </a:ext>
-                </a:extLst>
-              </a:tr>
-              <a:tr h="1129503">
                 <a:tc>
                   <a:txBody>
                     <a:bodyPr/>
@@ -3875,8 +3867,60 @@
                         </a:solidFill>
                       </a:endParaRPr>
                     </a:p>
+                  </a:txBody>
+                  <a:tcPr>
+                    <a:lnL w="12700" cap="flat" cmpd="sng" algn="ctr">
+                      <a:solidFill>
+                        <a:schemeClr val="tx1"/>
+                      </a:solidFill>
+                      <a:prstDash val="solid"/>
+                      <a:round/>
+                      <a:headEnd type="none" w="med" len="med"/>
+                      <a:tailEnd type="none" w="med" len="med"/>
+                    </a:lnL>
+                    <a:lnR w="12700" cap="flat" cmpd="sng" algn="ctr">
+                      <a:solidFill>
+                        <a:schemeClr val="tx1"/>
+                      </a:solidFill>
+                      <a:prstDash val="solid"/>
+                      <a:round/>
+                      <a:headEnd type="none" w="med" len="med"/>
+                      <a:tailEnd type="none" w="med" len="med"/>
+                    </a:lnR>
+                    <a:lnT w="12700" cap="flat" cmpd="sng" algn="ctr">
+                      <a:solidFill>
+                        <a:schemeClr val="tx1"/>
+                      </a:solidFill>
+                      <a:prstDash val="solid"/>
+                      <a:round/>
+                      <a:headEnd type="none" w="med" len="med"/>
+                      <a:tailEnd type="none" w="med" len="med"/>
+                    </a:lnT>
+                    <a:lnB w="12700" cap="flat" cmpd="sng" algn="ctr">
+                      <a:solidFill>
+                        <a:schemeClr val="tx1"/>
+                      </a:solidFill>
+                      <a:prstDash val="solid"/>
+                      <a:round/>
+                      <a:headEnd type="none" w="med" len="med"/>
+                      <a:tailEnd type="none" w="med" len="med"/>
+                    </a:lnB>
+                    <a:noFill/>
+                  </a:tcPr>
+                </a:tc>
+                <a:extLst>
+                  <a:ext uri="{0D108BD9-81ED-4DB2-BD59-A6C34878D82A}">
+                    <a16:rowId xmlns:a16="http://schemas.microsoft.com/office/drawing/2014/main" val="3678049630"/>
+                  </a:ext>
+                </a:extLst>
+              </a:tr>
+              <a:tr h="1107440">
+                <a:tc>
+                  <a:txBody>
+                    <a:bodyPr/>
+                    <a:lstStyle/>
                     <a:p>
-                      <a:pPr algn="ctr" fontAlgn="ctr"/>
+                      <a:pPr lvl="0" algn="ctr" fontAlgn="ctr"/>
                       <a:r>
                         <a:rPr lang="en-US" sz="2000" b="1" baseline="0" dirty="0">
                           <a:solidFill>
@@ -3887,7 +3931,7 @@
                       </a:r>
                     </a:p>
                   </a:txBody>
-                  <a:tcPr>
+                  <a:tcPr anchor="ctr">
                     <a:lnL w="12700" cap="flat" cmpd="sng" algn="ctr">
                       <a:solidFill>
                         <a:schemeClr val="tx1"/>
@@ -3938,14 +3982,6 @@
                     <a:lstStyle/>
                     <a:p>
                       <a:pPr algn="ctr" fontAlgn="ctr"/>
-                      <a:endParaRPr lang="en-US" sz="2000" b="1" baseline="0" dirty="0">
-                        <a:solidFill>
-                          <a:schemeClr val="bg1"/>
-                        </a:solidFill>
-                      </a:endParaRPr>
-                    </a:p>
-                    <a:p>
-                      <a:pPr algn="ctr" fontAlgn="ctr"/>
                       <a:r>
                         <a:rPr lang="en-US" sz="2000" b="1" baseline="0" dirty="0">
                           <a:solidFill>
@@ -3956,7 +3992,7 @@
                       </a:r>
                     </a:p>
                   </a:txBody>
-                  <a:tcPr>
+                  <a:tcPr anchor="ctr">
                     <a:lnL w="12700" cap="flat" cmpd="sng" algn="ctr">
                       <a:solidFill>
                         <a:schemeClr val="tx1"/>
@@ -4023,30 +4059,6 @@
                         <a:tabLst/>
                         <a:defRPr/>
                       </a:pPr>
-                      <a:endParaRPr lang="en-US" sz="2000" b="1" baseline="0" dirty="0">
-                        <a:solidFill>
-                          <a:schemeClr val="bg1"/>
-                        </a:solidFill>
-                      </a:endParaRPr>
-                    </a:p>
-                    <a:p>
-                      <a:pPr marL="0" marR="0" lvl="0" indent="0" algn="ctr" defTabSz="914400" rtl="0" eaLnBrk="1" fontAlgn="ctr" latinLnBrk="0" hangingPunct="1">
-                        <a:lnSpc>
-                          <a:spcPct val="100000"/>
-                        </a:lnSpc>
-                        <a:spcBef>
-                          <a:spcPts val="0"/>
-                        </a:spcBef>
-                        <a:spcAft>
-                          <a:spcPts val="0"/>
-                        </a:spcAft>
-                        <a:buClrTx/>
-                        <a:buSzTx/>
-                        <a:buFontTx/>
-                        <a:buNone/>
-                        <a:tabLst/>
-                        <a:defRPr/>
-                      </a:pPr>
                       <a:r>
                         <a:rPr lang="en-US" sz="2000" b="1" baseline="0" dirty="0">
                           <a:solidFill>
@@ -4056,16 +4068,8 @@
                         <a:t>JWT Propagation</a:t>
                       </a:r>
                     </a:p>
-                    <a:p>
-                      <a:pPr algn="ctr" fontAlgn="ctr"/>
-                      <a:endParaRPr lang="en-US" sz="2000" b="1" baseline="0" dirty="0">
-                        <a:solidFill>
-                          <a:schemeClr val="bg1"/>
-                        </a:solidFill>
-                      </a:endParaRPr>
-                    </a:p>
                   </a:txBody>
-                  <a:tcPr>
+                  <a:tcPr anchor="ctr">
                     <a:lnL w="12700" cap="flat" cmpd="sng" algn="ctr">
                       <a:solidFill>
                         <a:schemeClr val="tx1"/>
@@ -4132,30 +4136,6 @@
                         <a:tabLst/>
                         <a:defRPr/>
                       </a:pPr>
-                      <a:endParaRPr lang="en-US" sz="2000" b="1" baseline="0" dirty="0">
-                        <a:solidFill>
-                          <a:schemeClr val="bg1"/>
-                        </a:solidFill>
-                      </a:endParaRPr>
-                    </a:p>
-                    <a:p>
-                      <a:pPr marL="0" marR="0" lvl="0" indent="0" algn="ctr" defTabSz="914400" rtl="0" eaLnBrk="1" fontAlgn="ctr" latinLnBrk="0" hangingPunct="1">
-                        <a:lnSpc>
-                          <a:spcPct val="100000"/>
-                        </a:lnSpc>
-                        <a:spcBef>
-                          <a:spcPts val="0"/>
-                        </a:spcBef>
-                        <a:spcAft>
-                          <a:spcPts val="0"/>
-                        </a:spcAft>
-                        <a:buClrTx/>
-                        <a:buSzTx/>
-                        <a:buFontTx/>
-                        <a:buNone/>
-                        <a:tabLst/>
-                        <a:defRPr/>
-                      </a:pPr>
                       <a:r>
                         <a:rPr lang="en-US" sz="2000" b="1" baseline="0" dirty="0">
                           <a:solidFill>
@@ -4165,16 +4145,8 @@
                         <a:t>Config</a:t>
                       </a:r>
                     </a:p>
-                    <a:p>
-                      <a:pPr algn="ctr" fontAlgn="ctr"/>
-                      <a:endParaRPr lang="en-US" sz="2000" b="1" baseline="0" dirty="0">
-                        <a:solidFill>
-                          <a:schemeClr val="bg1"/>
-                        </a:solidFill>
-                      </a:endParaRPr>
-                    </a:p>
                   </a:txBody>
-                  <a:tcPr>
+                  <a:tcPr anchor="ctr">
                     <a:lnL w="12700" cap="flat" cmpd="sng" algn="ctr">
                       <a:solidFill>
                         <a:schemeClr val="tx1"/>
@@ -4272,41 +4244,70 @@
                     <a:noFill/>
                   </a:tcPr>
                 </a:tc>
+                <a:tc>
+                  <a:txBody>
+                    <a:bodyPr/>
+                    <a:lstStyle/>
+                    <a:p>
+                      <a:pPr algn="ctr" fontAlgn="ctr"/>
+                      <a:endParaRPr lang="en-US" sz="2000" b="1" baseline="0" dirty="0">
+                        <a:solidFill>
+                          <a:schemeClr val="bg1"/>
+                        </a:solidFill>
+                      </a:endParaRPr>
+                    </a:p>
+                  </a:txBody>
+                  <a:tcPr>
+                    <a:lnL w="12700" cap="flat" cmpd="sng" algn="ctr">
+                      <a:solidFill>
+                        <a:schemeClr val="tx1"/>
+                      </a:solidFill>
+                      <a:prstDash val="solid"/>
+                      <a:round/>
+                      <a:headEnd type="none" w="med" len="med"/>
+                      <a:tailEnd type="none" w="med" len="med"/>
+                    </a:lnL>
+                    <a:lnR w="12700" cap="flat" cmpd="sng" algn="ctr">
+                      <a:solidFill>
+                        <a:schemeClr val="tx1"/>
+                      </a:solidFill>
+                      <a:prstDash val="solid"/>
+                      <a:round/>
+                      <a:headEnd type="none" w="med" len="med"/>
+                      <a:tailEnd type="none" w="med" len="med"/>
+                    </a:lnR>
+                    <a:lnT w="12700" cap="flat" cmpd="sng" algn="ctr">
+                      <a:solidFill>
+                        <a:schemeClr val="tx1"/>
+                      </a:solidFill>
+                      <a:prstDash val="solid"/>
+                      <a:round/>
+                      <a:headEnd type="none" w="med" len="med"/>
+                      <a:tailEnd type="none" w="med" len="med"/>
+                    </a:lnT>
+                    <a:lnB w="12700" cap="flat" cmpd="sng" algn="ctr">
+                      <a:solidFill>
+                        <a:schemeClr val="tx1"/>
+                      </a:solidFill>
+                      <a:prstDash val="solid"/>
+                      <a:round/>
+                      <a:headEnd type="none" w="med" len="med"/>
+                      <a:tailEnd type="none" w="med" len="med"/>
+                    </a:lnB>
+                    <a:noFill/>
+                  </a:tcPr>
+                </a:tc>
                 <a:extLst>
                   <a:ext uri="{0D108BD9-81ED-4DB2-BD59-A6C34878D82A}">
                     <a16:rowId xmlns:a16="http://schemas.microsoft.com/office/drawing/2014/main" val="1382287090"/>
                   </a:ext>
                 </a:extLst>
               </a:tr>
-              <a:tr h="1129503">
+              <a:tr h="1107440">
                 <a:tc>
                   <a:txBody>
                     <a:bodyPr/>
                     <a:lstStyle/>
-                    <a:p>
-                      <a:pPr marL="0" marR="0" lvl="0" indent="0" algn="ctr" defTabSz="914400" rtl="0" eaLnBrk="1" fontAlgn="ctr" latinLnBrk="0" hangingPunct="1">
-                        <a:lnSpc>
-                          <a:spcPct val="100000"/>
-                        </a:lnSpc>
-                        <a:spcBef>
-                          <a:spcPts val="0"/>
-                        </a:spcBef>
-                        <a:spcAft>
-                          <a:spcPts val="0"/>
-                        </a:spcAft>
-                        <a:buClrTx/>
-                        <a:buSzTx/>
-                        <a:buFontTx/>
-                        <a:buNone/>
-                        <a:tabLst/>
-                        <a:defRPr/>
-                      </a:pPr>
-                      <a:endParaRPr lang="en-US" sz="2000" b="1" baseline="0" dirty="0">
-                        <a:solidFill>
-                          <a:schemeClr val="bg1"/>
-                        </a:solidFill>
-                      </a:endParaRPr>
-                    </a:p>
                     <a:p>
                       <a:pPr marL="0" marR="0" lvl="0" indent="0" algn="ctr" defTabSz="914400" rtl="0" eaLnBrk="1" fontAlgn="ctr" latinLnBrk="0" hangingPunct="1">
                         <a:lnSpc>
@@ -4334,106 +4335,8 @@
                         <a:t>Rest Client</a:t>
                       </a:r>
                     </a:p>
-                    <a:p>
-                      <a:pPr algn="ctr" fontAlgn="ctr"/>
-                      <a:endParaRPr lang="en-US" sz="2000" b="1" baseline="0" dirty="0">
-                        <a:solidFill>
-                          <a:schemeClr val="bg1"/>
-                        </a:solidFill>
-                      </a:endParaRPr>
-                    </a:p>
                   </a:txBody>
-                  <a:tcPr>
-                    <a:lnL w="12700" cap="flat" cmpd="sng" algn="ctr">
-                      <a:solidFill>
-                        <a:schemeClr val="tx1"/>
-                      </a:solidFill>
-                      <a:prstDash val="solid"/>
-                      <a:round/>
-                      <a:headEnd type="none" w="med" len="med"/>
-                      <a:tailEnd type="none" w="med" len="med"/>
-                    </a:lnL>
-                    <a:lnR w="12700" cap="flat" cmpd="sng" algn="ctr">
-                      <a:solidFill>
-                        <a:schemeClr val="tx1"/>
-                      </a:solidFill>
-                      <a:prstDash val="solid"/>
-                      <a:round/>
-                      <a:headEnd type="none" w="med" len="med"/>
-                      <a:tailEnd type="none" w="med" len="med"/>
-                    </a:lnR>
-                    <a:lnT w="12700" cap="flat" cmpd="sng" algn="ctr">
-                      <a:solidFill>
-                        <a:schemeClr val="tx1"/>
-                      </a:solidFill>
-                      <a:prstDash val="solid"/>
-                      <a:round/>
-                      <a:headEnd type="none" w="med" len="med"/>
-                      <a:tailEnd type="none" w="med" len="med"/>
-                    </a:lnT>
-                    <a:lnB w="12700" cap="flat" cmpd="sng" algn="ctr">
-                      <a:solidFill>
-                        <a:schemeClr val="tx1"/>
-                      </a:solidFill>
-                      <a:prstDash val="solid"/>
-                      <a:round/>
-                      <a:headEnd type="none" w="med" len="med"/>
-                      <a:tailEnd type="none" w="med" len="med"/>
-                    </a:lnB>
-                    <a:solidFill>
-                      <a:srgbClr val="E9922A"/>
-                    </a:solidFill>
-                  </a:tcPr>
-                </a:tc>
-                <a:tc>
-                  <a:txBody>
-                    <a:bodyPr/>
-                    <a:lstStyle/>
-                    <a:p>
-                      <a:pPr algn="ctr" fontAlgn="ctr"/>
-                      <a:endParaRPr lang="en-US" sz="2000" b="1" baseline="0" dirty="0">
-                        <a:solidFill>
-                          <a:schemeClr val="bg1"/>
-                        </a:solidFill>
-                      </a:endParaRPr>
-                    </a:p>
-                    <a:p>
-                      <a:pPr marL="0" marR="0" lvl="0" indent="0" algn="ctr" defTabSz="914400" rtl="0" eaLnBrk="1" fontAlgn="ctr" latinLnBrk="0" hangingPunct="1">
-                        <a:lnSpc>
-                          <a:spcPct val="100000"/>
-                        </a:lnSpc>
-                        <a:spcBef>
-                          <a:spcPts val="0"/>
-                        </a:spcBef>
-                        <a:spcAft>
-                          <a:spcPts val="0"/>
-                        </a:spcAft>
-                        <a:buClrTx/>
-                        <a:buSzTx/>
-                        <a:buFontTx/>
-                        <a:buNone/>
-                        <a:tabLst/>
-                        <a:defRPr/>
-                      </a:pPr>
-                      <a:r>
-                        <a:rPr lang="en-US" sz="2000" b="1" baseline="0" dirty="0">
-                          <a:solidFill>
-                            <a:schemeClr val="bg1"/>
-                          </a:solidFill>
-                        </a:rPr>
-                        <a:t>JAX-RS</a:t>
-                      </a:r>
-                    </a:p>
-                    <a:p>
-                      <a:pPr algn="ctr" fontAlgn="ctr"/>
-                      <a:endParaRPr lang="en-US" sz="2000" b="1" baseline="0" dirty="0">
-                        <a:solidFill>
-                          <a:schemeClr val="bg1"/>
-                        </a:solidFill>
-                      </a:endParaRPr>
-                    </a:p>
-                  </a:txBody>
-                  <a:tcPr>
+                  <a:tcPr anchor="ctr">
                     <a:lnL w="12700" cap="flat" cmpd="sng" algn="ctr">
                       <a:solidFill>
                         <a:schemeClr val="tx1"/>
@@ -4497,49 +4400,17 @@
                         <a:tabLst/>
                         <a:defRPr/>
                       </a:pPr>
-                      <a:endParaRPr lang="en-US" sz="2000" b="1" baseline="0" dirty="0">
-                        <a:solidFill>
-                          <a:schemeClr val="bg1"/>
-                        </a:solidFill>
-                      </a:endParaRPr>
-                    </a:p>
-                    <a:p>
-                      <a:pPr marL="0" marR="0" lvl="0" indent="0" algn="ctr" defTabSz="914400" rtl="0" eaLnBrk="1" fontAlgn="ctr" latinLnBrk="0" hangingPunct="1">
-                        <a:lnSpc>
-                          <a:spcPct val="100000"/>
-                        </a:lnSpc>
-                        <a:spcBef>
-                          <a:spcPts val="0"/>
-                        </a:spcBef>
-                        <a:spcAft>
-                          <a:spcPts val="0"/>
-                        </a:spcAft>
-                        <a:buClrTx/>
-                        <a:buSzTx/>
-                        <a:buFontTx/>
-                        <a:buNone/>
-                        <a:tabLst/>
-                        <a:defRPr/>
-                      </a:pPr>
                       <a:r>
                         <a:rPr lang="en-US" sz="2000" b="1" baseline="0" dirty="0">
                           <a:solidFill>
                             <a:schemeClr val="bg1"/>
                           </a:solidFill>
                         </a:rPr>
-                        <a:t>JSON-P</a:t>
+                        <a:t>JAX-RS</a:t>
                       </a:r>
                     </a:p>
-                    <a:p>
-                      <a:pPr algn="ctr" fontAlgn="ctr"/>
-                      <a:endParaRPr lang="en-US" sz="2000" b="1" baseline="0" dirty="0">
-                        <a:solidFill>
-                          <a:schemeClr val="bg1"/>
-                        </a:solidFill>
-                      </a:endParaRPr>
-                    </a:p>
                   </a:txBody>
-                  <a:tcPr>
+                  <a:tcPr anchor="ctr">
                     <a:lnL w="12700" cap="flat" cmpd="sng" algn="ctr">
                       <a:solidFill>
                         <a:schemeClr val="tx1"/>
@@ -4603,12 +4474,62 @@
                         <a:tabLst/>
                         <a:defRPr/>
                       </a:pPr>
-                      <a:endParaRPr lang="en-US" sz="2000" b="1" baseline="0" dirty="0">
-                        <a:solidFill>
-                          <a:schemeClr val="bg1"/>
-                        </a:solidFill>
-                      </a:endParaRPr>
+                      <a:r>
+                        <a:rPr lang="en-US" sz="2000" b="1" baseline="0" dirty="0">
+                          <a:solidFill>
+                            <a:schemeClr val="bg1"/>
+                          </a:solidFill>
+                        </a:rPr>
+                        <a:t>JSON-P</a:t>
+                      </a:r>
                     </a:p>
+                  </a:txBody>
+                  <a:tcPr anchor="ctr">
+                    <a:lnL w="12700" cap="flat" cmpd="sng" algn="ctr">
+                      <a:solidFill>
+                        <a:schemeClr val="tx1"/>
+                      </a:solidFill>
+                      <a:prstDash val="solid"/>
+                      <a:round/>
+                      <a:headEnd type="none" w="med" len="med"/>
+                      <a:tailEnd type="none" w="med" len="med"/>
+                    </a:lnL>
+                    <a:lnR w="12700" cap="flat" cmpd="sng" algn="ctr">
+                      <a:solidFill>
+                        <a:schemeClr val="tx1"/>
+                      </a:solidFill>
+                      <a:prstDash val="solid"/>
+                      <a:round/>
+                      <a:headEnd type="none" w="med" len="med"/>
+                      <a:tailEnd type="none" w="med" len="med"/>
+                    </a:lnR>
+                    <a:lnT w="12700" cap="flat" cmpd="sng" algn="ctr">
+                      <a:solidFill>
+                        <a:schemeClr val="tx1"/>
+                      </a:solidFill>
+                      <a:prstDash val="solid"/>
+                      <a:round/>
+                      <a:headEnd type="none" w="med" len="med"/>
+                      <a:tailEnd type="none" w="med" len="med"/>
+                    </a:lnT>
+                    <a:lnB w="12700" cap="flat" cmpd="sng" algn="ctr">
+                      <a:solidFill>
+                        <a:schemeClr val="tx1"/>
+                      </a:solidFill>
+                      <a:prstDash val="solid"/>
+                      <a:round/>
+                      <a:headEnd type="none" w="med" len="med"/>
+                      <a:tailEnd type="none" w="med" len="med"/>
+                    </a:lnB>
+                    <a:solidFill>
+                      <a:srgbClr val="E9922A"/>
+                    </a:solidFill>
+                  </a:tcPr>
+                </a:tc>
+                <a:tc>
+                  <a:txBody>
+                    <a:bodyPr/>
+                    <a:lstStyle/>
                     <a:p>
                       <a:pPr marL="0" marR="0" lvl="0" indent="0" algn="ctr" defTabSz="914400" rtl="0" eaLnBrk="1" fontAlgn="ctr" latinLnBrk="0" hangingPunct="1">
                         <a:lnSpc>
@@ -4636,16 +4557,8 @@
                         <a:t>JSON-B</a:t>
                       </a:r>
                     </a:p>
-                    <a:p>
-                      <a:pPr algn="ctr" fontAlgn="ctr"/>
-                      <a:endParaRPr lang="en-US" sz="2000" b="1" baseline="0" dirty="0">
-                        <a:solidFill>
-                          <a:schemeClr val="bg1"/>
-                        </a:solidFill>
-                      </a:endParaRPr>
-                    </a:p>
                   </a:txBody>
-                  <a:tcPr>
+                  <a:tcPr anchor="ctr">
                     <a:lnL w="12700" cap="flat" cmpd="sng" algn="ctr">
                       <a:solidFill>
                         <a:schemeClr val="tx1"/>
@@ -4693,14 +4606,6 @@
                     <a:lstStyle/>
                     <a:p>
                       <a:pPr algn="ctr" fontAlgn="ctr"/>
-                      <a:endParaRPr lang="en-US" sz="2000" b="1" baseline="0" dirty="0">
-                        <a:solidFill>
-                          <a:schemeClr val="bg1"/>
-                        </a:solidFill>
-                      </a:endParaRPr>
-                    </a:p>
-                    <a:p>
-                      <a:pPr algn="ctr" fontAlgn="ctr"/>
                       <a:r>
                         <a:rPr lang="en-US" sz="2000" b="1" baseline="0" dirty="0">
                           <a:solidFill>
@@ -4711,7 +4616,65 @@
                       </a:r>
                     </a:p>
                   </a:txBody>
-                  <a:tcPr>
+                  <a:tcPr anchor="ctr">
+                    <a:lnL w="12700" cap="flat" cmpd="sng" algn="ctr">
+                      <a:solidFill>
+                        <a:schemeClr val="tx1"/>
+                      </a:solidFill>
+                      <a:prstDash val="solid"/>
+                      <a:round/>
+                      <a:headEnd type="none" w="med" len="med"/>
+                      <a:tailEnd type="none" w="med" len="med"/>
+                    </a:lnL>
+                    <a:lnR w="12700" cap="flat" cmpd="sng" algn="ctr">
+                      <a:solidFill>
+                        <a:schemeClr val="tx1"/>
+                      </a:solidFill>
+                      <a:prstDash val="solid"/>
+                      <a:round/>
+                      <a:headEnd type="none" w="med" len="med"/>
+                      <a:tailEnd type="none" w="med" len="med"/>
+                    </a:lnR>
+                    <a:lnT w="12700" cap="flat" cmpd="sng" algn="ctr">
+                      <a:solidFill>
+                        <a:schemeClr val="tx1"/>
+                      </a:solidFill>
+                      <a:prstDash val="solid"/>
+                      <a:round/>
+                      <a:headEnd type="none" w="med" len="med"/>
+                      <a:tailEnd type="none" w="med" len="med"/>
+                    </a:lnT>
+                    <a:lnB w="12700" cap="flat" cmpd="sng" algn="ctr">
+                      <a:solidFill>
+                        <a:schemeClr val="tx1"/>
+                      </a:solidFill>
+                      <a:prstDash val="solid"/>
+                      <a:round/>
+                      <a:headEnd type="none" w="med" len="med"/>
+                      <a:tailEnd type="none" w="med" len="med"/>
+                    </a:lnB>
+                    <a:solidFill>
+                      <a:srgbClr val="E9922A"/>
+                    </a:solidFill>
+                  </a:tcPr>
+                </a:tc>
+                <a:tc>
+                  <a:txBody>
+                    <a:bodyPr/>
+                    <a:lstStyle/>
+                    <a:p>
+                      <a:pPr algn="ctr" fontAlgn="ctr"/>
+                      <a:r>
+                        <a:rPr lang="en-US" sz="2000" b="1" baseline="0" dirty="0">
+                          <a:solidFill>
+                            <a:schemeClr val="bg1"/>
+                          </a:solidFill>
+                        </a:rPr>
+                        <a:t>Reactive Streams Operators</a:t>
+                      </a:r>
+                    </a:p>
+                  </a:txBody>
+                  <a:tcPr anchor="ctr">
                     <a:lnL w="12700" cap="flat" cmpd="sng" algn="ctr">
                       <a:solidFill>
                         <a:schemeClr val="tx1"/>

</xml_diff>

<commit_message>
add section for other features, update diagram
</commit_message>
<xml_diff>
--- a/img/microprofile-layers.pptx
+++ b/img/microprofile-layers.pptx
@@ -259,7 +259,7 @@
           <a:p>
             <a:fld id="{560CAE67-5DF8-ED46-9BC4-17886CFB86D2}" type="datetimeFigureOut">
               <a:rPr lang="en-US" smtClean="0"/>
-              <a:t>5/22/19</a:t>
+              <a:t>1/31/20</a:t>
             </a:fld>
             <a:endParaRPr lang="en-US"/>
           </a:p>
@@ -457,7 +457,7 @@
           <a:p>
             <a:fld id="{560CAE67-5DF8-ED46-9BC4-17886CFB86D2}" type="datetimeFigureOut">
               <a:rPr lang="en-US" smtClean="0"/>
-              <a:t>5/22/19</a:t>
+              <a:t>1/31/20</a:t>
             </a:fld>
             <a:endParaRPr lang="en-US"/>
           </a:p>
@@ -665,7 +665,7 @@
           <a:p>
             <a:fld id="{560CAE67-5DF8-ED46-9BC4-17886CFB86D2}" type="datetimeFigureOut">
               <a:rPr lang="en-US" smtClean="0"/>
-              <a:t>5/22/19</a:t>
+              <a:t>1/31/20</a:t>
             </a:fld>
             <a:endParaRPr lang="en-US"/>
           </a:p>
@@ -863,7 +863,7 @@
           <a:p>
             <a:fld id="{560CAE67-5DF8-ED46-9BC4-17886CFB86D2}" type="datetimeFigureOut">
               <a:rPr lang="en-US" smtClean="0"/>
-              <a:t>5/22/19</a:t>
+              <a:t>1/31/20</a:t>
             </a:fld>
             <a:endParaRPr lang="en-US"/>
           </a:p>
@@ -1138,7 +1138,7 @@
           <a:p>
             <a:fld id="{560CAE67-5DF8-ED46-9BC4-17886CFB86D2}" type="datetimeFigureOut">
               <a:rPr lang="en-US" smtClean="0"/>
-              <a:t>5/22/19</a:t>
+              <a:t>1/31/20</a:t>
             </a:fld>
             <a:endParaRPr lang="en-US"/>
           </a:p>
@@ -1403,7 +1403,7 @@
           <a:p>
             <a:fld id="{560CAE67-5DF8-ED46-9BC4-17886CFB86D2}" type="datetimeFigureOut">
               <a:rPr lang="en-US" smtClean="0"/>
-              <a:t>5/22/19</a:t>
+              <a:t>1/31/20</a:t>
             </a:fld>
             <a:endParaRPr lang="en-US"/>
           </a:p>
@@ -1815,7 +1815,7 @@
           <a:p>
             <a:fld id="{560CAE67-5DF8-ED46-9BC4-17886CFB86D2}" type="datetimeFigureOut">
               <a:rPr lang="en-US" smtClean="0"/>
-              <a:t>5/22/19</a:t>
+              <a:t>1/31/20</a:t>
             </a:fld>
             <a:endParaRPr lang="en-US"/>
           </a:p>
@@ -1956,7 +1956,7 @@
           <a:p>
             <a:fld id="{560CAE67-5DF8-ED46-9BC4-17886CFB86D2}" type="datetimeFigureOut">
               <a:rPr lang="en-US" smtClean="0"/>
-              <a:t>5/22/19</a:t>
+              <a:t>1/31/20</a:t>
             </a:fld>
             <a:endParaRPr lang="en-US"/>
           </a:p>
@@ -2069,7 +2069,7 @@
           <a:p>
             <a:fld id="{560CAE67-5DF8-ED46-9BC4-17886CFB86D2}" type="datetimeFigureOut">
               <a:rPr lang="en-US" smtClean="0"/>
-              <a:t>5/22/19</a:t>
+              <a:t>1/31/20</a:t>
             </a:fld>
             <a:endParaRPr lang="en-US"/>
           </a:p>
@@ -2380,7 +2380,7 @@
           <a:p>
             <a:fld id="{560CAE67-5DF8-ED46-9BC4-17886CFB86D2}" type="datetimeFigureOut">
               <a:rPr lang="en-US" smtClean="0"/>
-              <a:t>5/22/19</a:t>
+              <a:t>1/31/20</a:t>
             </a:fld>
             <a:endParaRPr lang="en-US"/>
           </a:p>
@@ -2668,7 +2668,7 @@
           <a:p>
             <a:fld id="{560CAE67-5DF8-ED46-9BC4-17886CFB86D2}" type="datetimeFigureOut">
               <a:rPr lang="en-US" smtClean="0"/>
-              <a:t>5/22/19</a:t>
+              <a:t>1/31/20</a:t>
             </a:fld>
             <a:endParaRPr lang="en-US"/>
           </a:p>
@@ -2909,7 +2909,7 @@
           <a:p>
             <a:fld id="{560CAE67-5DF8-ED46-9BC4-17886CFB86D2}" type="datetimeFigureOut">
               <a:rPr lang="en-US" smtClean="0"/>
-              <a:t>5/22/19</a:t>
+              <a:t>1/31/20</a:t>
             </a:fld>
             <a:endParaRPr lang="en-US"/>
           </a:p>
@@ -3396,7 +3396,7 @@
         </p:nvSpPr>
         <p:spPr>
           <a:xfrm>
-            <a:off x="4307622" y="5048172"/>
+            <a:off x="4319671" y="5048172"/>
             <a:ext cx="3552659" cy="584775"/>
           </a:xfrm>
           <a:prstGeom prst="rect">
@@ -3434,14 +3434,14 @@
           <p:nvPr>
             <p:extLst>
               <p:ext uri="{D42A27DB-BD31-4B8C-83A1-F6EECF244321}">
-                <p14:modId xmlns:p14="http://schemas.microsoft.com/office/powerpoint/2010/main" val="3232219925"/>
+                <p14:modId xmlns:p14="http://schemas.microsoft.com/office/powerpoint/2010/main" val="3705450271"/>
               </p:ext>
             </p:extLst>
           </p:nvPr>
         </p:nvGraphicFramePr>
         <p:xfrm>
           <a:off x="1063896" y="1725852"/>
-          <a:ext cx="10040112" cy="3322320"/>
+          <a:ext cx="10098090" cy="3322320"/>
         </p:xfrm>
         <a:graphic>
           <a:graphicData uri="http://schemas.openxmlformats.org/drawingml/2006/table">
@@ -3450,45 +3450,38 @@
                 <a:tableStyleId>{5C22544A-7EE6-4342-B048-85BDC9FD1C3A}</a:tableStyleId>
               </a:tblPr>
               <a:tblGrid>
-                <a:gridCol w="1673352">
+                <a:gridCol w="2019618">
                   <a:extLst>
                     <a:ext uri="{9D8B030D-6E8A-4147-A177-3AD203B41FA5}">
                       <a16:colId xmlns:a16="http://schemas.microsoft.com/office/drawing/2014/main" val="2453142836"/>
                     </a:ext>
                   </a:extLst>
                 </a:gridCol>
-                <a:gridCol w="1673352">
+                <a:gridCol w="2019618">
                   <a:extLst>
                     <a:ext uri="{9D8B030D-6E8A-4147-A177-3AD203B41FA5}">
                       <a16:colId xmlns:a16="http://schemas.microsoft.com/office/drawing/2014/main" val="3352789823"/>
                     </a:ext>
                   </a:extLst>
                 </a:gridCol>
-                <a:gridCol w="1673352">
+                <a:gridCol w="2019618">
                   <a:extLst>
                     <a:ext uri="{9D8B030D-6E8A-4147-A177-3AD203B41FA5}">
                       <a16:colId xmlns:a16="http://schemas.microsoft.com/office/drawing/2014/main" val="2607940811"/>
                     </a:ext>
                   </a:extLst>
                 </a:gridCol>
-                <a:gridCol w="1673352">
+                <a:gridCol w="2019618">
                   <a:extLst>
                     <a:ext uri="{9D8B030D-6E8A-4147-A177-3AD203B41FA5}">
                       <a16:colId xmlns:a16="http://schemas.microsoft.com/office/drawing/2014/main" val="805729673"/>
                     </a:ext>
                   </a:extLst>
                 </a:gridCol>
-                <a:gridCol w="1673352">
+                <a:gridCol w="2019618">
                   <a:extLst>
                     <a:ext uri="{9D8B030D-6E8A-4147-A177-3AD203B41FA5}">
                       <a16:colId xmlns:a16="http://schemas.microsoft.com/office/drawing/2014/main" val="176977035"/>
-                    </a:ext>
-                  </a:extLst>
-                </a:gridCol>
-                <a:gridCol w="1673352">
-                  <a:extLst>
-                    <a:ext uri="{9D8B030D-6E8A-4147-A177-3AD203B41FA5}">
-                      <a16:colId xmlns:a16="http://schemas.microsoft.com/office/drawing/2014/main" val="1382515521"/>
                     </a:ext>
                   </a:extLst>
                 </a:gridCol>
@@ -3855,59 +3848,6 @@
                     <a:noFill/>
                   </a:tcPr>
                 </a:tc>
-                <a:tc>
-                  <a:txBody>
-                    <a:bodyPr/>
-                    <a:lstStyle/>
-                    <a:p>
-                      <a:pPr algn="ctr" fontAlgn="ctr"/>
-                      <a:endParaRPr lang="en-US" sz="2000" b="1" baseline="0" dirty="0">
-                        <a:solidFill>
-                          <a:schemeClr val="bg1"/>
-                        </a:solidFill>
-                      </a:endParaRPr>
-                    </a:p>
-                  </a:txBody>
-                  <a:tcPr>
-                    <a:lnL w="12700" cap="flat" cmpd="sng" algn="ctr">
-                      <a:solidFill>
-                        <a:schemeClr val="tx1"/>
-                      </a:solidFill>
-                      <a:prstDash val="solid"/>
-                      <a:round/>
-                      <a:headEnd type="none" w="med" len="med"/>
-                      <a:tailEnd type="none" w="med" len="med"/>
-                    </a:lnL>
-                    <a:lnR w="12700" cap="flat" cmpd="sng" algn="ctr">
-                      <a:solidFill>
-                        <a:schemeClr val="tx1"/>
-                      </a:solidFill>
-                      <a:prstDash val="solid"/>
-                      <a:round/>
-                      <a:headEnd type="none" w="med" len="med"/>
-                      <a:tailEnd type="none" w="med" len="med"/>
-                    </a:lnR>
-                    <a:lnT w="12700" cap="flat" cmpd="sng" algn="ctr">
-                      <a:solidFill>
-                        <a:schemeClr val="tx1"/>
-                      </a:solidFill>
-                      <a:prstDash val="solid"/>
-                      <a:round/>
-                      <a:headEnd type="none" w="med" len="med"/>
-                      <a:tailEnd type="none" w="med" len="med"/>
-                    </a:lnT>
-                    <a:lnB w="12700" cap="flat" cmpd="sng" algn="ctr">
-                      <a:solidFill>
-                        <a:schemeClr val="tx1"/>
-                      </a:solidFill>
-                      <a:prstDash val="solid"/>
-                      <a:round/>
-                      <a:headEnd type="none" w="med" len="med"/>
-                      <a:tailEnd type="none" w="med" len="med"/>
-                    </a:lnB>
-                    <a:noFill/>
-                  </a:tcPr>
-                </a:tc>
                 <a:extLst>
                   <a:ext uri="{0D108BD9-81ED-4DB2-BD59-A6C34878D82A}">
                     <a16:rowId xmlns:a16="http://schemas.microsoft.com/office/drawing/2014/main" val="3678049630"/>
@@ -4189,59 +4129,6 @@
                         <a:lumOff val="40000"/>
                       </a:schemeClr>
                     </a:solidFill>
-                  </a:tcPr>
-                </a:tc>
-                <a:tc>
-                  <a:txBody>
-                    <a:bodyPr/>
-                    <a:lstStyle/>
-                    <a:p>
-                      <a:pPr algn="ctr" fontAlgn="ctr"/>
-                      <a:endParaRPr lang="en-US" sz="2000" b="1" baseline="0" dirty="0">
-                        <a:solidFill>
-                          <a:schemeClr val="bg1"/>
-                        </a:solidFill>
-                      </a:endParaRPr>
-                    </a:p>
-                  </a:txBody>
-                  <a:tcPr>
-                    <a:lnL w="12700" cap="flat" cmpd="sng" algn="ctr">
-                      <a:solidFill>
-                        <a:schemeClr val="tx1"/>
-                      </a:solidFill>
-                      <a:prstDash val="solid"/>
-                      <a:round/>
-                      <a:headEnd type="none" w="med" len="med"/>
-                      <a:tailEnd type="none" w="med" len="med"/>
-                    </a:lnL>
-                    <a:lnR w="12700" cap="flat" cmpd="sng" algn="ctr">
-                      <a:solidFill>
-                        <a:schemeClr val="tx1"/>
-                      </a:solidFill>
-                      <a:prstDash val="solid"/>
-                      <a:round/>
-                      <a:headEnd type="none" w="med" len="med"/>
-                      <a:tailEnd type="none" w="med" len="med"/>
-                    </a:lnR>
-                    <a:lnT w="12700" cap="flat" cmpd="sng" algn="ctr">
-                      <a:solidFill>
-                        <a:schemeClr val="tx1"/>
-                      </a:solidFill>
-                      <a:prstDash val="solid"/>
-                      <a:round/>
-                      <a:headEnd type="none" w="med" len="med"/>
-                      <a:tailEnd type="none" w="med" len="med"/>
-                    </a:lnT>
-                    <a:lnB w="12700" cap="flat" cmpd="sng" algn="ctr">
-                      <a:solidFill>
-                        <a:schemeClr val="tx1"/>
-                      </a:solidFill>
-                      <a:prstDash val="solid"/>
-                      <a:round/>
-                      <a:headEnd type="none" w="med" len="med"/>
-                      <a:tailEnd type="none" w="med" len="med"/>
-                    </a:lnB>
-                    <a:noFill/>
                   </a:tcPr>
                 </a:tc>
                 <a:tc>
@@ -4613,64 +4500,6 @@
                           </a:solidFill>
                         </a:rPr>
                         <a:t>CDI</a:t>
-                      </a:r>
-                    </a:p>
-                  </a:txBody>
-                  <a:tcPr anchor="ctr">
-                    <a:lnL w="12700" cap="flat" cmpd="sng" algn="ctr">
-                      <a:solidFill>
-                        <a:schemeClr val="tx1"/>
-                      </a:solidFill>
-                      <a:prstDash val="solid"/>
-                      <a:round/>
-                      <a:headEnd type="none" w="med" len="med"/>
-                      <a:tailEnd type="none" w="med" len="med"/>
-                    </a:lnL>
-                    <a:lnR w="12700" cap="flat" cmpd="sng" algn="ctr">
-                      <a:solidFill>
-                        <a:schemeClr val="tx1"/>
-                      </a:solidFill>
-                      <a:prstDash val="solid"/>
-                      <a:round/>
-                      <a:headEnd type="none" w="med" len="med"/>
-                      <a:tailEnd type="none" w="med" len="med"/>
-                    </a:lnR>
-                    <a:lnT w="12700" cap="flat" cmpd="sng" algn="ctr">
-                      <a:solidFill>
-                        <a:schemeClr val="tx1"/>
-                      </a:solidFill>
-                      <a:prstDash val="solid"/>
-                      <a:round/>
-                      <a:headEnd type="none" w="med" len="med"/>
-                      <a:tailEnd type="none" w="med" len="med"/>
-                    </a:lnT>
-                    <a:lnB w="12700" cap="flat" cmpd="sng" algn="ctr">
-                      <a:solidFill>
-                        <a:schemeClr val="tx1"/>
-                      </a:solidFill>
-                      <a:prstDash val="solid"/>
-                      <a:round/>
-                      <a:headEnd type="none" w="med" len="med"/>
-                      <a:tailEnd type="none" w="med" len="med"/>
-                    </a:lnB>
-                    <a:solidFill>
-                      <a:srgbClr val="E9922A"/>
-                    </a:solidFill>
-                  </a:tcPr>
-                </a:tc>
-                <a:tc>
-                  <a:txBody>
-                    <a:bodyPr/>
-                    <a:lstStyle/>
-                    <a:p>
-                      <a:pPr algn="ctr" fontAlgn="ctr"/>
-                      <a:r>
-                        <a:rPr lang="en-US" sz="2000" b="1" baseline="0" dirty="0">
-                          <a:solidFill>
-                            <a:schemeClr val="bg1"/>
-                          </a:solidFill>
-                        </a:rPr>
-                        <a:t>Reactive Streams Operators</a:t>
                       </a:r>
                     </a:p>
                   </a:txBody>

</xml_diff>